<commit_message>
Release Tote transaction completed.
</commit_message>
<xml_diff>
--- a/NFLWarehouse/NFLWarehouse/icons/Icons Design.pptx
+++ b/NFLWarehouse/NFLWarehouse/icons/Icons Design.pptx
@@ -264,7 +264,7 @@
           <a:p>
             <a:fld id="{E5C7EA15-A1A1-46A1-9F88-F45FB0CDCF01}" type="datetimeFigureOut">
               <a:rPr lang="en-US" smtClean="0"/>
-              <a:t>8/5/2021</a:t>
+              <a:t>11/27/2021</a:t>
             </a:fld>
             <a:endParaRPr lang="en-US"/>
           </a:p>
@@ -462,7 +462,7 @@
           <a:p>
             <a:fld id="{E5C7EA15-A1A1-46A1-9F88-F45FB0CDCF01}" type="datetimeFigureOut">
               <a:rPr lang="en-US" smtClean="0"/>
-              <a:t>8/5/2021</a:t>
+              <a:t>11/27/2021</a:t>
             </a:fld>
             <a:endParaRPr lang="en-US"/>
           </a:p>
@@ -670,7 +670,7 @@
           <a:p>
             <a:fld id="{E5C7EA15-A1A1-46A1-9F88-F45FB0CDCF01}" type="datetimeFigureOut">
               <a:rPr lang="en-US" smtClean="0"/>
-              <a:t>8/5/2021</a:t>
+              <a:t>11/27/2021</a:t>
             </a:fld>
             <a:endParaRPr lang="en-US"/>
           </a:p>
@@ -868,7 +868,7 @@
           <a:p>
             <a:fld id="{E5C7EA15-A1A1-46A1-9F88-F45FB0CDCF01}" type="datetimeFigureOut">
               <a:rPr lang="en-US" smtClean="0"/>
-              <a:t>8/5/2021</a:t>
+              <a:t>11/27/2021</a:t>
             </a:fld>
             <a:endParaRPr lang="en-US"/>
           </a:p>
@@ -1143,7 +1143,7 @@
           <a:p>
             <a:fld id="{E5C7EA15-A1A1-46A1-9F88-F45FB0CDCF01}" type="datetimeFigureOut">
               <a:rPr lang="en-US" smtClean="0"/>
-              <a:t>8/5/2021</a:t>
+              <a:t>11/27/2021</a:t>
             </a:fld>
             <a:endParaRPr lang="en-US"/>
           </a:p>
@@ -1408,7 +1408,7 @@
           <a:p>
             <a:fld id="{E5C7EA15-A1A1-46A1-9F88-F45FB0CDCF01}" type="datetimeFigureOut">
               <a:rPr lang="en-US" smtClean="0"/>
-              <a:t>8/5/2021</a:t>
+              <a:t>11/27/2021</a:t>
             </a:fld>
             <a:endParaRPr lang="en-US"/>
           </a:p>
@@ -1820,7 +1820,7 @@
           <a:p>
             <a:fld id="{E5C7EA15-A1A1-46A1-9F88-F45FB0CDCF01}" type="datetimeFigureOut">
               <a:rPr lang="en-US" smtClean="0"/>
-              <a:t>8/5/2021</a:t>
+              <a:t>11/27/2021</a:t>
             </a:fld>
             <a:endParaRPr lang="en-US"/>
           </a:p>
@@ -1961,7 +1961,7 @@
           <a:p>
             <a:fld id="{E5C7EA15-A1A1-46A1-9F88-F45FB0CDCF01}" type="datetimeFigureOut">
               <a:rPr lang="en-US" smtClean="0"/>
-              <a:t>8/5/2021</a:t>
+              <a:t>11/27/2021</a:t>
             </a:fld>
             <a:endParaRPr lang="en-US"/>
           </a:p>
@@ -2074,7 +2074,7 @@
           <a:p>
             <a:fld id="{E5C7EA15-A1A1-46A1-9F88-F45FB0CDCF01}" type="datetimeFigureOut">
               <a:rPr lang="en-US" smtClean="0"/>
-              <a:t>8/5/2021</a:t>
+              <a:t>11/27/2021</a:t>
             </a:fld>
             <a:endParaRPr lang="en-US"/>
           </a:p>
@@ -2385,7 +2385,7 @@
           <a:p>
             <a:fld id="{E5C7EA15-A1A1-46A1-9F88-F45FB0CDCF01}" type="datetimeFigureOut">
               <a:rPr lang="en-US" smtClean="0"/>
-              <a:t>8/5/2021</a:t>
+              <a:t>11/27/2021</a:t>
             </a:fld>
             <a:endParaRPr lang="en-US"/>
           </a:p>
@@ -2673,7 +2673,7 @@
           <a:p>
             <a:fld id="{E5C7EA15-A1A1-46A1-9F88-F45FB0CDCF01}" type="datetimeFigureOut">
               <a:rPr lang="en-US" smtClean="0"/>
-              <a:t>8/5/2021</a:t>
+              <a:t>11/27/2021</a:t>
             </a:fld>
             <a:endParaRPr lang="en-US"/>
           </a:p>
@@ -2914,7 +2914,7 @@
           <a:p>
             <a:fld id="{E5C7EA15-A1A1-46A1-9F88-F45FB0CDCF01}" type="datetimeFigureOut">
               <a:rPr lang="en-US" smtClean="0"/>
-              <a:t>8/5/2021</a:t>
+              <a:t>11/27/2021</a:t>
             </a:fld>
             <a:endParaRPr lang="en-US"/>
           </a:p>
@@ -3385,49 +3385,6 @@
           </a:p>
         </p:txBody>
       </p:sp>
-      <p:cxnSp>
-        <p:nvCxnSpPr>
-          <p:cNvPr id="6" name="Straight Connector 5">
-            <a:extLst>
-              <a:ext uri="{FF2B5EF4-FFF2-40B4-BE49-F238E27FC236}">
-                <a16:creationId xmlns:a16="http://schemas.microsoft.com/office/drawing/2014/main" id="{AEEC96F3-E227-40A0-9A58-9720BE4B4BDF}"/>
-              </a:ext>
-            </a:extLst>
-          </p:cNvPr>
-          <p:cNvCxnSpPr>
-            <a:cxnSpLocks/>
-          </p:cNvCxnSpPr>
-          <p:nvPr/>
-        </p:nvCxnSpPr>
-        <p:spPr>
-          <a:xfrm>
-            <a:off x="1818626" y="1633216"/>
-            <a:ext cx="1704975" cy="0"/>
-          </a:xfrm>
-          <a:prstGeom prst="line">
-            <a:avLst/>
-          </a:prstGeom>
-          <a:ln w="222250">
-            <a:solidFill>
-              <a:srgbClr val="3EF850"/>
-            </a:solidFill>
-          </a:ln>
-        </p:spPr>
-        <p:style>
-          <a:lnRef idx="1">
-            <a:schemeClr val="accent1"/>
-          </a:lnRef>
-          <a:fillRef idx="0">
-            <a:schemeClr val="accent1"/>
-          </a:fillRef>
-          <a:effectRef idx="0">
-            <a:schemeClr val="accent1"/>
-          </a:effectRef>
-          <a:fontRef idx="minor">
-            <a:schemeClr val="tx1"/>
-          </a:fontRef>
-        </p:style>
-      </p:cxnSp>
       <p:sp>
         <p:nvSpPr>
           <p:cNvPr id="9" name="Rectangle 8">
@@ -4650,6 +4607,1275 @@
           </a:p>
         </p:txBody>
       </p:sp>
+      <p:cxnSp>
+        <p:nvCxnSpPr>
+          <p:cNvPr id="16" name="Straight Connector 15">
+            <a:extLst>
+              <a:ext uri="{FF2B5EF4-FFF2-40B4-BE49-F238E27FC236}">
+                <a16:creationId xmlns:a16="http://schemas.microsoft.com/office/drawing/2014/main" id="{48A55672-85FC-4C60-A5FB-02DDD62A252F}"/>
+              </a:ext>
+            </a:extLst>
+          </p:cNvPr>
+          <p:cNvCxnSpPr>
+            <a:cxnSpLocks/>
+          </p:cNvCxnSpPr>
+          <p:nvPr/>
+        </p:nvCxnSpPr>
+        <p:spPr>
+          <a:xfrm>
+            <a:off x="1780527" y="1618712"/>
+            <a:ext cx="1781175" cy="0"/>
+          </a:xfrm>
+          <a:prstGeom prst="line">
+            <a:avLst/>
+          </a:prstGeom>
+          <a:ln w="222250">
+            <a:solidFill>
+              <a:srgbClr val="3EF850"/>
+            </a:solidFill>
+          </a:ln>
+        </p:spPr>
+        <p:style>
+          <a:lnRef idx="1">
+            <a:schemeClr val="accent1"/>
+          </a:lnRef>
+          <a:fillRef idx="0">
+            <a:schemeClr val="accent1"/>
+          </a:fillRef>
+          <a:effectRef idx="0">
+            <a:schemeClr val="accent1"/>
+          </a:effectRef>
+          <a:fontRef idx="minor">
+            <a:schemeClr val="tx1"/>
+          </a:fontRef>
+        </p:style>
+      </p:cxnSp>
+      <p:sp>
+        <p:nvSpPr>
+          <p:cNvPr id="62" name="Rectangle 61">
+            <a:extLst>
+              <a:ext uri="{FF2B5EF4-FFF2-40B4-BE49-F238E27FC236}">
+                <a16:creationId xmlns:a16="http://schemas.microsoft.com/office/drawing/2014/main" id="{7D5AFDD7-BE6B-4755-BCE1-F7C50D442A75}"/>
+              </a:ext>
+            </a:extLst>
+          </p:cNvPr>
+          <p:cNvSpPr>
+            <a:spLocks noChangeAspect="1"/>
+          </p:cNvSpPr>
+          <p:nvPr/>
+        </p:nvSpPr>
+        <p:spPr>
+          <a:xfrm>
+            <a:off x="4249168" y="3261079"/>
+            <a:ext cx="2368395" cy="2369248"/>
+          </a:xfrm>
+          <a:prstGeom prst="rect">
+            <a:avLst/>
+          </a:prstGeom>
+          <a:noFill/>
+          <a:ln w="76200">
+            <a:solidFill>
+              <a:srgbClr val="3EF850"/>
+            </a:solidFill>
+          </a:ln>
+        </p:spPr>
+        <p:style>
+          <a:lnRef idx="2">
+            <a:schemeClr val="accent1">
+              <a:shade val="50000"/>
+            </a:schemeClr>
+          </a:lnRef>
+          <a:fillRef idx="1">
+            <a:schemeClr val="accent1"/>
+          </a:fillRef>
+          <a:effectRef idx="0">
+            <a:schemeClr val="accent1"/>
+          </a:effectRef>
+          <a:fontRef idx="minor">
+            <a:schemeClr val="lt1"/>
+          </a:fontRef>
+        </p:style>
+        <p:txBody>
+          <a:bodyPr rtlCol="0" anchor="ctr"/>
+          <a:lstStyle/>
+          <a:p>
+            <a:pPr algn="ctr"/>
+            <a:endParaRPr lang="en-US"/>
+          </a:p>
+        </p:txBody>
+      </p:sp>
+      <p:sp>
+        <p:nvSpPr>
+          <p:cNvPr id="67" name="Rectangle 66">
+            <a:extLst>
+              <a:ext uri="{FF2B5EF4-FFF2-40B4-BE49-F238E27FC236}">
+                <a16:creationId xmlns:a16="http://schemas.microsoft.com/office/drawing/2014/main" id="{0CAD05C9-D756-4B99-BA70-9FD8802C71F6}"/>
+              </a:ext>
+            </a:extLst>
+          </p:cNvPr>
+          <p:cNvSpPr>
+            <a:spLocks noChangeAspect="1"/>
+          </p:cNvSpPr>
+          <p:nvPr/>
+        </p:nvSpPr>
+        <p:spPr>
+          <a:xfrm>
+            <a:off x="4533252" y="3521404"/>
+            <a:ext cx="1781175" cy="1781817"/>
+          </a:xfrm>
+          <a:prstGeom prst="rect">
+            <a:avLst/>
+          </a:prstGeom>
+          <a:noFill/>
+          <a:ln w="76200">
+            <a:solidFill>
+              <a:srgbClr val="3EF850">
+                <a:alpha val="20000"/>
+              </a:srgbClr>
+            </a:solidFill>
+          </a:ln>
+        </p:spPr>
+        <p:style>
+          <a:lnRef idx="2">
+            <a:schemeClr val="accent1">
+              <a:shade val="50000"/>
+            </a:schemeClr>
+          </a:lnRef>
+          <a:fillRef idx="1">
+            <a:schemeClr val="accent1"/>
+          </a:fillRef>
+          <a:effectRef idx="0">
+            <a:schemeClr val="accent1"/>
+          </a:effectRef>
+          <a:fontRef idx="minor">
+            <a:schemeClr val="lt1"/>
+          </a:fontRef>
+        </p:style>
+        <p:txBody>
+          <a:bodyPr rtlCol="0" anchor="ctr"/>
+          <a:lstStyle/>
+          <a:p>
+            <a:pPr algn="ctr"/>
+            <a:endParaRPr lang="en-US"/>
+          </a:p>
+        </p:txBody>
+      </p:sp>
+      <p:cxnSp>
+        <p:nvCxnSpPr>
+          <p:cNvPr id="71" name="Straight Connector 70">
+            <a:extLst>
+              <a:ext uri="{FF2B5EF4-FFF2-40B4-BE49-F238E27FC236}">
+                <a16:creationId xmlns:a16="http://schemas.microsoft.com/office/drawing/2014/main" id="{D1952344-FD29-4517-AAD5-FEC8A2FBA6BE}"/>
+              </a:ext>
+            </a:extLst>
+          </p:cNvPr>
+          <p:cNvCxnSpPr>
+            <a:cxnSpLocks/>
+          </p:cNvCxnSpPr>
+          <p:nvPr/>
+        </p:nvCxnSpPr>
+        <p:spPr>
+          <a:xfrm>
+            <a:off x="4827554" y="4852814"/>
+            <a:ext cx="255091" cy="0"/>
+          </a:xfrm>
+          <a:prstGeom prst="line">
+            <a:avLst/>
+          </a:prstGeom>
+          <a:ln w="63500">
+            <a:solidFill>
+              <a:srgbClr val="3EF850"/>
+            </a:solidFill>
+          </a:ln>
+        </p:spPr>
+        <p:style>
+          <a:lnRef idx="1">
+            <a:schemeClr val="accent1"/>
+          </a:lnRef>
+          <a:fillRef idx="0">
+            <a:schemeClr val="accent1"/>
+          </a:fillRef>
+          <a:effectRef idx="0">
+            <a:schemeClr val="accent1"/>
+          </a:effectRef>
+          <a:fontRef idx="minor">
+            <a:schemeClr val="tx1"/>
+          </a:fontRef>
+        </p:style>
+      </p:cxnSp>
+      <p:cxnSp>
+        <p:nvCxnSpPr>
+          <p:cNvPr id="72" name="Straight Connector 71">
+            <a:extLst>
+              <a:ext uri="{FF2B5EF4-FFF2-40B4-BE49-F238E27FC236}">
+                <a16:creationId xmlns:a16="http://schemas.microsoft.com/office/drawing/2014/main" id="{08DAF07F-582C-4B9B-A2DB-4F9578420975}"/>
+              </a:ext>
+            </a:extLst>
+          </p:cNvPr>
+          <p:cNvCxnSpPr>
+            <a:cxnSpLocks/>
+          </p:cNvCxnSpPr>
+          <p:nvPr/>
+        </p:nvCxnSpPr>
+        <p:spPr>
+          <a:xfrm>
+            <a:off x="5149980" y="4856200"/>
+            <a:ext cx="255091" cy="0"/>
+          </a:xfrm>
+          <a:prstGeom prst="line">
+            <a:avLst/>
+          </a:prstGeom>
+          <a:ln w="63500">
+            <a:solidFill>
+              <a:srgbClr val="3EF850"/>
+            </a:solidFill>
+          </a:ln>
+        </p:spPr>
+        <p:style>
+          <a:lnRef idx="1">
+            <a:schemeClr val="accent1"/>
+          </a:lnRef>
+          <a:fillRef idx="0">
+            <a:schemeClr val="accent1"/>
+          </a:fillRef>
+          <a:effectRef idx="0">
+            <a:schemeClr val="accent1"/>
+          </a:effectRef>
+          <a:fontRef idx="minor">
+            <a:schemeClr val="tx1"/>
+          </a:fontRef>
+        </p:style>
+      </p:cxnSp>
+      <p:cxnSp>
+        <p:nvCxnSpPr>
+          <p:cNvPr id="73" name="Straight Connector 72">
+            <a:extLst>
+              <a:ext uri="{FF2B5EF4-FFF2-40B4-BE49-F238E27FC236}">
+                <a16:creationId xmlns:a16="http://schemas.microsoft.com/office/drawing/2014/main" id="{BE858CD5-3E30-417F-8982-CCCC97BE9AC4}"/>
+              </a:ext>
+            </a:extLst>
+          </p:cNvPr>
+          <p:cNvCxnSpPr>
+            <a:cxnSpLocks/>
+          </p:cNvCxnSpPr>
+          <p:nvPr/>
+        </p:nvCxnSpPr>
+        <p:spPr>
+          <a:xfrm>
+            <a:off x="5470172" y="4853747"/>
+            <a:ext cx="255091" cy="0"/>
+          </a:xfrm>
+          <a:prstGeom prst="line">
+            <a:avLst/>
+          </a:prstGeom>
+          <a:ln w="63500">
+            <a:solidFill>
+              <a:srgbClr val="3EF850"/>
+            </a:solidFill>
+          </a:ln>
+        </p:spPr>
+        <p:style>
+          <a:lnRef idx="1">
+            <a:schemeClr val="accent1"/>
+          </a:lnRef>
+          <a:fillRef idx="0">
+            <a:schemeClr val="accent1"/>
+          </a:fillRef>
+          <a:effectRef idx="0">
+            <a:schemeClr val="accent1"/>
+          </a:effectRef>
+          <a:fontRef idx="minor">
+            <a:schemeClr val="tx1"/>
+          </a:fontRef>
+        </p:style>
+      </p:cxnSp>
+      <p:cxnSp>
+        <p:nvCxnSpPr>
+          <p:cNvPr id="74" name="Straight Connector 73">
+            <a:extLst>
+              <a:ext uri="{FF2B5EF4-FFF2-40B4-BE49-F238E27FC236}">
+                <a16:creationId xmlns:a16="http://schemas.microsoft.com/office/drawing/2014/main" id="{F25A4688-0D96-4A10-9806-7C9E088F37F3}"/>
+              </a:ext>
+            </a:extLst>
+          </p:cNvPr>
+          <p:cNvCxnSpPr>
+            <a:cxnSpLocks/>
+          </p:cNvCxnSpPr>
+          <p:nvPr/>
+        </p:nvCxnSpPr>
+        <p:spPr>
+          <a:xfrm>
+            <a:off x="5785306" y="4856200"/>
+            <a:ext cx="255091" cy="0"/>
+          </a:xfrm>
+          <a:prstGeom prst="line">
+            <a:avLst/>
+          </a:prstGeom>
+          <a:ln w="63500">
+            <a:solidFill>
+              <a:srgbClr val="3EF850"/>
+            </a:solidFill>
+          </a:ln>
+        </p:spPr>
+        <p:style>
+          <a:lnRef idx="1">
+            <a:schemeClr val="accent1"/>
+          </a:lnRef>
+          <a:fillRef idx="0">
+            <a:schemeClr val="accent1"/>
+          </a:fillRef>
+          <a:effectRef idx="0">
+            <a:schemeClr val="accent1"/>
+          </a:effectRef>
+          <a:fontRef idx="minor">
+            <a:schemeClr val="tx1"/>
+          </a:fontRef>
+        </p:style>
+      </p:cxnSp>
+      <p:grpSp>
+        <p:nvGrpSpPr>
+          <p:cNvPr id="28" name="Group 27">
+            <a:extLst>
+              <a:ext uri="{FF2B5EF4-FFF2-40B4-BE49-F238E27FC236}">
+                <a16:creationId xmlns:a16="http://schemas.microsoft.com/office/drawing/2014/main" id="{06F9AC2C-A901-4724-8877-96F5B671D032}"/>
+              </a:ext>
+            </a:extLst>
+          </p:cNvPr>
+          <p:cNvGrpSpPr/>
+          <p:nvPr/>
+        </p:nvGrpSpPr>
+        <p:grpSpPr>
+          <a:xfrm flipV="1">
+            <a:off x="4903922" y="3525221"/>
+            <a:ext cx="1106555" cy="836589"/>
+            <a:chOff x="4830034" y="3645291"/>
+            <a:chExt cx="1106555" cy="836589"/>
+          </a:xfrm>
+        </p:grpSpPr>
+        <p:sp>
+          <p:nvSpPr>
+            <p:cNvPr id="76" name="Isosceles Triangle 75">
+              <a:extLst>
+                <a:ext uri="{FF2B5EF4-FFF2-40B4-BE49-F238E27FC236}">
+                  <a16:creationId xmlns:a16="http://schemas.microsoft.com/office/drawing/2014/main" id="{C2295656-9C69-4550-8E11-E7406E552FF2}"/>
+                </a:ext>
+              </a:extLst>
+            </p:cNvPr>
+            <p:cNvSpPr/>
+            <p:nvPr/>
+          </p:nvSpPr>
+          <p:spPr>
+            <a:xfrm flipV="1">
+              <a:off x="4830034" y="3879253"/>
+              <a:ext cx="1106555" cy="602627"/>
+            </a:xfrm>
+            <a:prstGeom prst="triangle">
+              <a:avLst/>
+            </a:prstGeom>
+            <a:solidFill>
+              <a:srgbClr val="3EF850"/>
+            </a:solidFill>
+            <a:ln>
+              <a:noFill/>
+            </a:ln>
+          </p:spPr>
+          <p:style>
+            <a:lnRef idx="2">
+              <a:schemeClr val="accent1">
+                <a:shade val="50000"/>
+              </a:schemeClr>
+            </a:lnRef>
+            <a:fillRef idx="1">
+              <a:schemeClr val="accent1"/>
+            </a:fillRef>
+            <a:effectRef idx="0">
+              <a:schemeClr val="accent1"/>
+            </a:effectRef>
+            <a:fontRef idx="minor">
+              <a:schemeClr val="lt1"/>
+            </a:fontRef>
+          </p:style>
+          <p:txBody>
+            <a:bodyPr rtlCol="0" anchor="ctr"/>
+            <a:lstStyle/>
+            <a:p>
+              <a:pPr algn="ctr"/>
+              <a:endParaRPr lang="en-US"/>
+            </a:p>
+          </p:txBody>
+        </p:sp>
+        <p:cxnSp>
+          <p:nvCxnSpPr>
+            <p:cNvPr id="77" name="Straight Connector 76">
+              <a:extLst>
+                <a:ext uri="{FF2B5EF4-FFF2-40B4-BE49-F238E27FC236}">
+                  <a16:creationId xmlns:a16="http://schemas.microsoft.com/office/drawing/2014/main" id="{4DA64646-AA64-4815-ADF5-5E633BE2976A}"/>
+                </a:ext>
+              </a:extLst>
+            </p:cNvPr>
+            <p:cNvCxnSpPr>
+              <a:cxnSpLocks/>
+            </p:cNvCxnSpPr>
+            <p:nvPr/>
+          </p:nvCxnSpPr>
+          <p:spPr>
+            <a:xfrm flipV="1">
+              <a:off x="5383311" y="3645291"/>
+              <a:ext cx="0" cy="233962"/>
+            </a:xfrm>
+            <a:prstGeom prst="line">
+              <a:avLst/>
+            </a:prstGeom>
+            <a:ln w="222250">
+              <a:solidFill>
+                <a:srgbClr val="3EF850"/>
+              </a:solidFill>
+            </a:ln>
+          </p:spPr>
+          <p:style>
+            <a:lnRef idx="1">
+              <a:schemeClr val="accent1"/>
+            </a:lnRef>
+            <a:fillRef idx="0">
+              <a:schemeClr val="accent1"/>
+            </a:fillRef>
+            <a:effectRef idx="0">
+              <a:schemeClr val="accent1"/>
+            </a:effectRef>
+            <a:fontRef idx="minor">
+              <a:schemeClr val="tx1"/>
+            </a:fontRef>
+          </p:style>
+        </p:cxnSp>
+      </p:grpSp>
+      <p:cxnSp>
+        <p:nvCxnSpPr>
+          <p:cNvPr id="78" name="Straight Connector 77">
+            <a:extLst>
+              <a:ext uri="{FF2B5EF4-FFF2-40B4-BE49-F238E27FC236}">
+                <a16:creationId xmlns:a16="http://schemas.microsoft.com/office/drawing/2014/main" id="{2328EC60-C842-4508-9469-800BF7FC5388}"/>
+              </a:ext>
+            </a:extLst>
+          </p:cNvPr>
+          <p:cNvCxnSpPr>
+            <a:cxnSpLocks/>
+          </p:cNvCxnSpPr>
+          <p:nvPr/>
+        </p:nvCxnSpPr>
+        <p:spPr>
+          <a:xfrm flipV="1">
+            <a:off x="4607788" y="4355846"/>
+            <a:ext cx="0" cy="765717"/>
+          </a:xfrm>
+          <a:prstGeom prst="line">
+            <a:avLst/>
+          </a:prstGeom>
+          <a:ln w="222250">
+            <a:solidFill>
+              <a:srgbClr val="3EF850"/>
+            </a:solidFill>
+          </a:ln>
+        </p:spPr>
+        <p:style>
+          <a:lnRef idx="1">
+            <a:schemeClr val="accent1"/>
+          </a:lnRef>
+          <a:fillRef idx="0">
+            <a:schemeClr val="accent1"/>
+          </a:fillRef>
+          <a:effectRef idx="0">
+            <a:schemeClr val="accent1"/>
+          </a:effectRef>
+          <a:fontRef idx="minor">
+            <a:schemeClr val="tx1"/>
+          </a:fontRef>
+        </p:style>
+      </p:cxnSp>
+      <p:cxnSp>
+        <p:nvCxnSpPr>
+          <p:cNvPr id="80" name="Straight Connector 79">
+            <a:extLst>
+              <a:ext uri="{FF2B5EF4-FFF2-40B4-BE49-F238E27FC236}">
+                <a16:creationId xmlns:a16="http://schemas.microsoft.com/office/drawing/2014/main" id="{23F8D89F-7C25-42AA-A57C-B6E94FE2AF10}"/>
+              </a:ext>
+            </a:extLst>
+          </p:cNvPr>
+          <p:cNvCxnSpPr>
+            <a:cxnSpLocks/>
+          </p:cNvCxnSpPr>
+          <p:nvPr/>
+        </p:nvCxnSpPr>
+        <p:spPr>
+          <a:xfrm>
+            <a:off x="4497705" y="5232533"/>
+            <a:ext cx="1850081" cy="0"/>
+          </a:xfrm>
+          <a:prstGeom prst="line">
+            <a:avLst/>
+          </a:prstGeom>
+          <a:ln w="222250">
+            <a:solidFill>
+              <a:srgbClr val="3EF850"/>
+            </a:solidFill>
+          </a:ln>
+        </p:spPr>
+        <p:style>
+          <a:lnRef idx="1">
+            <a:schemeClr val="accent1"/>
+          </a:lnRef>
+          <a:fillRef idx="0">
+            <a:schemeClr val="accent1"/>
+          </a:fillRef>
+          <a:effectRef idx="0">
+            <a:schemeClr val="accent1"/>
+          </a:effectRef>
+          <a:fontRef idx="minor">
+            <a:schemeClr val="tx1"/>
+          </a:fontRef>
+        </p:style>
+      </p:cxnSp>
+      <p:cxnSp>
+        <p:nvCxnSpPr>
+          <p:cNvPr id="81" name="Straight Connector 80">
+            <a:extLst>
+              <a:ext uri="{FF2B5EF4-FFF2-40B4-BE49-F238E27FC236}">
+                <a16:creationId xmlns:a16="http://schemas.microsoft.com/office/drawing/2014/main" id="{DB8A557B-3C15-43FF-AA36-B3F65933F1D5}"/>
+              </a:ext>
+            </a:extLst>
+          </p:cNvPr>
+          <p:cNvCxnSpPr>
+            <a:cxnSpLocks/>
+          </p:cNvCxnSpPr>
+          <p:nvPr/>
+        </p:nvCxnSpPr>
+        <p:spPr>
+          <a:xfrm flipV="1">
+            <a:off x="6238468" y="4355079"/>
+            <a:ext cx="0" cy="765717"/>
+          </a:xfrm>
+          <a:prstGeom prst="line">
+            <a:avLst/>
+          </a:prstGeom>
+          <a:ln w="222250">
+            <a:solidFill>
+              <a:srgbClr val="3EF850"/>
+            </a:solidFill>
+          </a:ln>
+        </p:spPr>
+        <p:style>
+          <a:lnRef idx="1">
+            <a:schemeClr val="accent1"/>
+          </a:lnRef>
+          <a:fillRef idx="0">
+            <a:schemeClr val="accent1"/>
+          </a:fillRef>
+          <a:effectRef idx="0">
+            <a:schemeClr val="accent1"/>
+          </a:effectRef>
+          <a:fontRef idx="minor">
+            <a:schemeClr val="tx1"/>
+          </a:fontRef>
+        </p:style>
+      </p:cxnSp>
+      <p:cxnSp>
+        <p:nvCxnSpPr>
+          <p:cNvPr id="83" name="Straight Connector 82">
+            <a:extLst>
+              <a:ext uri="{FF2B5EF4-FFF2-40B4-BE49-F238E27FC236}">
+                <a16:creationId xmlns:a16="http://schemas.microsoft.com/office/drawing/2014/main" id="{01AC7ECC-F037-4D63-BCED-18F75EE55761}"/>
+              </a:ext>
+            </a:extLst>
+          </p:cNvPr>
+          <p:cNvCxnSpPr>
+            <a:cxnSpLocks/>
+          </p:cNvCxnSpPr>
+          <p:nvPr/>
+        </p:nvCxnSpPr>
+        <p:spPr>
+          <a:xfrm flipH="1">
+            <a:off x="4555374" y="4466095"/>
+            <a:ext cx="288773" cy="0"/>
+          </a:xfrm>
+          <a:prstGeom prst="line">
+            <a:avLst/>
+          </a:prstGeom>
+          <a:ln w="222250">
+            <a:solidFill>
+              <a:srgbClr val="3EF850"/>
+            </a:solidFill>
+          </a:ln>
+        </p:spPr>
+        <p:style>
+          <a:lnRef idx="1">
+            <a:schemeClr val="accent1"/>
+          </a:lnRef>
+          <a:fillRef idx="0">
+            <a:schemeClr val="accent1"/>
+          </a:fillRef>
+          <a:effectRef idx="0">
+            <a:schemeClr val="accent1"/>
+          </a:effectRef>
+          <a:fontRef idx="minor">
+            <a:schemeClr val="tx1"/>
+          </a:fontRef>
+        </p:style>
+      </p:cxnSp>
+      <p:cxnSp>
+        <p:nvCxnSpPr>
+          <p:cNvPr id="86" name="Straight Connector 85">
+            <a:extLst>
+              <a:ext uri="{FF2B5EF4-FFF2-40B4-BE49-F238E27FC236}">
+                <a16:creationId xmlns:a16="http://schemas.microsoft.com/office/drawing/2014/main" id="{1EAF86CF-4ACB-49AB-A8CD-CD23B89E42C0}"/>
+              </a:ext>
+            </a:extLst>
+          </p:cNvPr>
+          <p:cNvCxnSpPr>
+            <a:cxnSpLocks/>
+          </p:cNvCxnSpPr>
+          <p:nvPr/>
+        </p:nvCxnSpPr>
+        <p:spPr>
+          <a:xfrm flipH="1">
+            <a:off x="6003527" y="4466095"/>
+            <a:ext cx="288773" cy="0"/>
+          </a:xfrm>
+          <a:prstGeom prst="line">
+            <a:avLst/>
+          </a:prstGeom>
+          <a:ln w="222250">
+            <a:solidFill>
+              <a:srgbClr val="3EF850"/>
+            </a:solidFill>
+          </a:ln>
+        </p:spPr>
+        <p:style>
+          <a:lnRef idx="1">
+            <a:schemeClr val="accent1"/>
+          </a:lnRef>
+          <a:fillRef idx="0">
+            <a:schemeClr val="accent1"/>
+          </a:fillRef>
+          <a:effectRef idx="0">
+            <a:schemeClr val="accent1"/>
+          </a:effectRef>
+          <a:fontRef idx="minor">
+            <a:schemeClr val="tx1"/>
+          </a:fontRef>
+        </p:style>
+      </p:cxnSp>
+      <p:sp>
+        <p:nvSpPr>
+          <p:cNvPr id="87" name="Rectangle 86">
+            <a:extLst>
+              <a:ext uri="{FF2B5EF4-FFF2-40B4-BE49-F238E27FC236}">
+                <a16:creationId xmlns:a16="http://schemas.microsoft.com/office/drawing/2014/main" id="{ECF60BBA-B899-4B4C-85A9-025212743CF5}"/>
+              </a:ext>
+            </a:extLst>
+          </p:cNvPr>
+          <p:cNvSpPr>
+            <a:spLocks noChangeAspect="1"/>
+          </p:cNvSpPr>
+          <p:nvPr/>
+        </p:nvSpPr>
+        <p:spPr>
+          <a:xfrm>
+            <a:off x="1500366" y="3250148"/>
+            <a:ext cx="2368395" cy="2369248"/>
+          </a:xfrm>
+          <a:prstGeom prst="rect">
+            <a:avLst/>
+          </a:prstGeom>
+          <a:noFill/>
+          <a:ln w="76200">
+            <a:solidFill>
+              <a:srgbClr val="3EF850"/>
+            </a:solidFill>
+          </a:ln>
+        </p:spPr>
+        <p:style>
+          <a:lnRef idx="2">
+            <a:schemeClr val="accent1">
+              <a:shade val="50000"/>
+            </a:schemeClr>
+          </a:lnRef>
+          <a:fillRef idx="1">
+            <a:schemeClr val="accent1"/>
+          </a:fillRef>
+          <a:effectRef idx="0">
+            <a:schemeClr val="accent1"/>
+          </a:effectRef>
+          <a:fontRef idx="minor">
+            <a:schemeClr val="lt1"/>
+          </a:fontRef>
+        </p:style>
+        <p:txBody>
+          <a:bodyPr rtlCol="0" anchor="ctr"/>
+          <a:lstStyle/>
+          <a:p>
+            <a:pPr algn="ctr"/>
+            <a:endParaRPr lang="en-US"/>
+          </a:p>
+        </p:txBody>
+      </p:sp>
+      <p:sp>
+        <p:nvSpPr>
+          <p:cNvPr id="88" name="Rectangle 87">
+            <a:extLst>
+              <a:ext uri="{FF2B5EF4-FFF2-40B4-BE49-F238E27FC236}">
+                <a16:creationId xmlns:a16="http://schemas.microsoft.com/office/drawing/2014/main" id="{2153A7A2-A9E5-4AF6-8347-AB1F32FF0415}"/>
+              </a:ext>
+            </a:extLst>
+          </p:cNvPr>
+          <p:cNvSpPr>
+            <a:spLocks noChangeAspect="1"/>
+          </p:cNvSpPr>
+          <p:nvPr/>
+        </p:nvSpPr>
+        <p:spPr>
+          <a:xfrm>
+            <a:off x="1784450" y="3510473"/>
+            <a:ext cx="1781175" cy="1781817"/>
+          </a:xfrm>
+          <a:prstGeom prst="rect">
+            <a:avLst/>
+          </a:prstGeom>
+          <a:noFill/>
+          <a:ln w="76200">
+            <a:solidFill>
+              <a:srgbClr val="3EF850">
+                <a:alpha val="20000"/>
+              </a:srgbClr>
+            </a:solidFill>
+          </a:ln>
+        </p:spPr>
+        <p:style>
+          <a:lnRef idx="2">
+            <a:schemeClr val="accent1">
+              <a:shade val="50000"/>
+            </a:schemeClr>
+          </a:lnRef>
+          <a:fillRef idx="1">
+            <a:schemeClr val="accent1"/>
+          </a:fillRef>
+          <a:effectRef idx="0">
+            <a:schemeClr val="accent1"/>
+          </a:effectRef>
+          <a:fontRef idx="minor">
+            <a:schemeClr val="lt1"/>
+          </a:fontRef>
+        </p:style>
+        <p:txBody>
+          <a:bodyPr rtlCol="0" anchor="ctr"/>
+          <a:lstStyle/>
+          <a:p>
+            <a:pPr algn="ctr"/>
+            <a:endParaRPr lang="en-US"/>
+          </a:p>
+        </p:txBody>
+      </p:sp>
+      <p:cxnSp>
+        <p:nvCxnSpPr>
+          <p:cNvPr id="90" name="Straight Connector 89">
+            <a:extLst>
+              <a:ext uri="{FF2B5EF4-FFF2-40B4-BE49-F238E27FC236}">
+                <a16:creationId xmlns:a16="http://schemas.microsoft.com/office/drawing/2014/main" id="{FBF33B8A-35BE-492B-BFD0-7DC1D4B08601}"/>
+              </a:ext>
+            </a:extLst>
+          </p:cNvPr>
+          <p:cNvCxnSpPr>
+            <a:cxnSpLocks/>
+          </p:cNvCxnSpPr>
+          <p:nvPr/>
+        </p:nvCxnSpPr>
+        <p:spPr>
+          <a:xfrm>
+            <a:off x="2078752" y="4841883"/>
+            <a:ext cx="255091" cy="0"/>
+          </a:xfrm>
+          <a:prstGeom prst="line">
+            <a:avLst/>
+          </a:prstGeom>
+          <a:ln w="63500">
+            <a:solidFill>
+              <a:srgbClr val="3EF850"/>
+            </a:solidFill>
+          </a:ln>
+        </p:spPr>
+        <p:style>
+          <a:lnRef idx="1">
+            <a:schemeClr val="accent1"/>
+          </a:lnRef>
+          <a:fillRef idx="0">
+            <a:schemeClr val="accent1"/>
+          </a:fillRef>
+          <a:effectRef idx="0">
+            <a:schemeClr val="accent1"/>
+          </a:effectRef>
+          <a:fontRef idx="minor">
+            <a:schemeClr val="tx1"/>
+          </a:fontRef>
+        </p:style>
+      </p:cxnSp>
+      <p:cxnSp>
+        <p:nvCxnSpPr>
+          <p:cNvPr id="91" name="Straight Connector 90">
+            <a:extLst>
+              <a:ext uri="{FF2B5EF4-FFF2-40B4-BE49-F238E27FC236}">
+                <a16:creationId xmlns:a16="http://schemas.microsoft.com/office/drawing/2014/main" id="{3C5ED2E3-FC38-4747-8550-2AFCDA04CA2F}"/>
+              </a:ext>
+            </a:extLst>
+          </p:cNvPr>
+          <p:cNvCxnSpPr>
+            <a:cxnSpLocks/>
+          </p:cNvCxnSpPr>
+          <p:nvPr/>
+        </p:nvCxnSpPr>
+        <p:spPr>
+          <a:xfrm>
+            <a:off x="2401178" y="4845269"/>
+            <a:ext cx="255091" cy="0"/>
+          </a:xfrm>
+          <a:prstGeom prst="line">
+            <a:avLst/>
+          </a:prstGeom>
+          <a:ln w="63500">
+            <a:solidFill>
+              <a:srgbClr val="3EF850"/>
+            </a:solidFill>
+          </a:ln>
+        </p:spPr>
+        <p:style>
+          <a:lnRef idx="1">
+            <a:schemeClr val="accent1"/>
+          </a:lnRef>
+          <a:fillRef idx="0">
+            <a:schemeClr val="accent1"/>
+          </a:fillRef>
+          <a:effectRef idx="0">
+            <a:schemeClr val="accent1"/>
+          </a:effectRef>
+          <a:fontRef idx="minor">
+            <a:schemeClr val="tx1"/>
+          </a:fontRef>
+        </p:style>
+      </p:cxnSp>
+      <p:cxnSp>
+        <p:nvCxnSpPr>
+          <p:cNvPr id="92" name="Straight Connector 91">
+            <a:extLst>
+              <a:ext uri="{FF2B5EF4-FFF2-40B4-BE49-F238E27FC236}">
+                <a16:creationId xmlns:a16="http://schemas.microsoft.com/office/drawing/2014/main" id="{C353D3CF-3020-4C80-8E27-2A44E5CCCB37}"/>
+              </a:ext>
+            </a:extLst>
+          </p:cNvPr>
+          <p:cNvCxnSpPr>
+            <a:cxnSpLocks/>
+          </p:cNvCxnSpPr>
+          <p:nvPr/>
+        </p:nvCxnSpPr>
+        <p:spPr>
+          <a:xfrm>
+            <a:off x="2721370" y="4842816"/>
+            <a:ext cx="255091" cy="0"/>
+          </a:xfrm>
+          <a:prstGeom prst="line">
+            <a:avLst/>
+          </a:prstGeom>
+          <a:ln w="63500">
+            <a:solidFill>
+              <a:srgbClr val="3EF850"/>
+            </a:solidFill>
+          </a:ln>
+        </p:spPr>
+        <p:style>
+          <a:lnRef idx="1">
+            <a:schemeClr val="accent1"/>
+          </a:lnRef>
+          <a:fillRef idx="0">
+            <a:schemeClr val="accent1"/>
+          </a:fillRef>
+          <a:effectRef idx="0">
+            <a:schemeClr val="accent1"/>
+          </a:effectRef>
+          <a:fontRef idx="minor">
+            <a:schemeClr val="tx1"/>
+          </a:fontRef>
+        </p:style>
+      </p:cxnSp>
+      <p:cxnSp>
+        <p:nvCxnSpPr>
+          <p:cNvPr id="93" name="Straight Connector 92">
+            <a:extLst>
+              <a:ext uri="{FF2B5EF4-FFF2-40B4-BE49-F238E27FC236}">
+                <a16:creationId xmlns:a16="http://schemas.microsoft.com/office/drawing/2014/main" id="{DAC9227D-473B-4EDE-84E9-D149001B7360}"/>
+              </a:ext>
+            </a:extLst>
+          </p:cNvPr>
+          <p:cNvCxnSpPr>
+            <a:cxnSpLocks/>
+          </p:cNvCxnSpPr>
+          <p:nvPr/>
+        </p:nvCxnSpPr>
+        <p:spPr>
+          <a:xfrm>
+            <a:off x="3036504" y="4845269"/>
+            <a:ext cx="255091" cy="0"/>
+          </a:xfrm>
+          <a:prstGeom prst="line">
+            <a:avLst/>
+          </a:prstGeom>
+          <a:ln w="63500">
+            <a:solidFill>
+              <a:srgbClr val="3EF850"/>
+            </a:solidFill>
+          </a:ln>
+        </p:spPr>
+        <p:style>
+          <a:lnRef idx="1">
+            <a:schemeClr val="accent1"/>
+          </a:lnRef>
+          <a:fillRef idx="0">
+            <a:schemeClr val="accent1"/>
+          </a:fillRef>
+          <a:effectRef idx="0">
+            <a:schemeClr val="accent1"/>
+          </a:effectRef>
+          <a:fontRef idx="minor">
+            <a:schemeClr val="tx1"/>
+          </a:fontRef>
+        </p:style>
+      </p:cxnSp>
+      <p:grpSp>
+        <p:nvGrpSpPr>
+          <p:cNvPr id="94" name="Group 93">
+            <a:extLst>
+              <a:ext uri="{FF2B5EF4-FFF2-40B4-BE49-F238E27FC236}">
+                <a16:creationId xmlns:a16="http://schemas.microsoft.com/office/drawing/2014/main" id="{9A40633E-20CC-4DCF-8DF8-9C76B96EEEC8}"/>
+              </a:ext>
+            </a:extLst>
+          </p:cNvPr>
+          <p:cNvGrpSpPr/>
+          <p:nvPr/>
+        </p:nvGrpSpPr>
+        <p:grpSpPr>
+          <a:xfrm>
+            <a:off x="2155120" y="3514290"/>
+            <a:ext cx="1106555" cy="836589"/>
+            <a:chOff x="4830034" y="3645291"/>
+            <a:chExt cx="1106555" cy="836589"/>
+          </a:xfrm>
+        </p:grpSpPr>
+        <p:sp>
+          <p:nvSpPr>
+            <p:cNvPr id="95" name="Isosceles Triangle 94">
+              <a:extLst>
+                <a:ext uri="{FF2B5EF4-FFF2-40B4-BE49-F238E27FC236}">
+                  <a16:creationId xmlns:a16="http://schemas.microsoft.com/office/drawing/2014/main" id="{9CE2E6E7-9C7F-46BB-B74A-8F03DBE7295F}"/>
+                </a:ext>
+              </a:extLst>
+            </p:cNvPr>
+            <p:cNvSpPr/>
+            <p:nvPr/>
+          </p:nvSpPr>
+          <p:spPr>
+            <a:xfrm flipV="1">
+              <a:off x="4830034" y="3879253"/>
+              <a:ext cx="1106555" cy="602627"/>
+            </a:xfrm>
+            <a:prstGeom prst="triangle">
+              <a:avLst/>
+            </a:prstGeom>
+            <a:solidFill>
+              <a:srgbClr val="3EF850"/>
+            </a:solidFill>
+            <a:ln>
+              <a:noFill/>
+            </a:ln>
+          </p:spPr>
+          <p:style>
+            <a:lnRef idx="2">
+              <a:schemeClr val="accent1">
+                <a:shade val="50000"/>
+              </a:schemeClr>
+            </a:lnRef>
+            <a:fillRef idx="1">
+              <a:schemeClr val="accent1"/>
+            </a:fillRef>
+            <a:effectRef idx="0">
+              <a:schemeClr val="accent1"/>
+            </a:effectRef>
+            <a:fontRef idx="minor">
+              <a:schemeClr val="lt1"/>
+            </a:fontRef>
+          </p:style>
+          <p:txBody>
+            <a:bodyPr rtlCol="0" anchor="ctr"/>
+            <a:lstStyle/>
+            <a:p>
+              <a:pPr algn="ctr"/>
+              <a:endParaRPr lang="en-US"/>
+            </a:p>
+          </p:txBody>
+        </p:sp>
+        <p:cxnSp>
+          <p:nvCxnSpPr>
+            <p:cNvPr id="96" name="Straight Connector 95">
+              <a:extLst>
+                <a:ext uri="{FF2B5EF4-FFF2-40B4-BE49-F238E27FC236}">
+                  <a16:creationId xmlns:a16="http://schemas.microsoft.com/office/drawing/2014/main" id="{A0D909CC-FE0A-4334-ABBA-325789CCE178}"/>
+                </a:ext>
+              </a:extLst>
+            </p:cNvPr>
+            <p:cNvCxnSpPr>
+              <a:cxnSpLocks/>
+            </p:cNvCxnSpPr>
+            <p:nvPr/>
+          </p:nvCxnSpPr>
+          <p:spPr>
+            <a:xfrm flipV="1">
+              <a:off x="5383311" y="3645291"/>
+              <a:ext cx="0" cy="233962"/>
+            </a:xfrm>
+            <a:prstGeom prst="line">
+              <a:avLst/>
+            </a:prstGeom>
+            <a:ln w="222250">
+              <a:solidFill>
+                <a:srgbClr val="3EF850"/>
+              </a:solidFill>
+            </a:ln>
+          </p:spPr>
+          <p:style>
+            <a:lnRef idx="1">
+              <a:schemeClr val="accent1"/>
+            </a:lnRef>
+            <a:fillRef idx="0">
+              <a:schemeClr val="accent1"/>
+            </a:fillRef>
+            <a:effectRef idx="0">
+              <a:schemeClr val="accent1"/>
+            </a:effectRef>
+            <a:fontRef idx="minor">
+              <a:schemeClr val="tx1"/>
+            </a:fontRef>
+          </p:style>
+        </p:cxnSp>
+      </p:grpSp>
+      <p:cxnSp>
+        <p:nvCxnSpPr>
+          <p:cNvPr id="97" name="Straight Connector 96">
+            <a:extLst>
+              <a:ext uri="{FF2B5EF4-FFF2-40B4-BE49-F238E27FC236}">
+                <a16:creationId xmlns:a16="http://schemas.microsoft.com/office/drawing/2014/main" id="{C8A89D7A-7119-4BAF-A906-9ED5173F765C}"/>
+              </a:ext>
+            </a:extLst>
+          </p:cNvPr>
+          <p:cNvCxnSpPr>
+            <a:cxnSpLocks/>
+          </p:cNvCxnSpPr>
+          <p:nvPr/>
+        </p:nvCxnSpPr>
+        <p:spPr>
+          <a:xfrm flipV="1">
+            <a:off x="1858986" y="4344915"/>
+            <a:ext cx="0" cy="765717"/>
+          </a:xfrm>
+          <a:prstGeom prst="line">
+            <a:avLst/>
+          </a:prstGeom>
+          <a:ln w="222250">
+            <a:solidFill>
+              <a:srgbClr val="3EF850"/>
+            </a:solidFill>
+          </a:ln>
+        </p:spPr>
+        <p:style>
+          <a:lnRef idx="1">
+            <a:schemeClr val="accent1"/>
+          </a:lnRef>
+          <a:fillRef idx="0">
+            <a:schemeClr val="accent1"/>
+          </a:fillRef>
+          <a:effectRef idx="0">
+            <a:schemeClr val="accent1"/>
+          </a:effectRef>
+          <a:fontRef idx="minor">
+            <a:schemeClr val="tx1"/>
+          </a:fontRef>
+        </p:style>
+      </p:cxnSp>
+      <p:cxnSp>
+        <p:nvCxnSpPr>
+          <p:cNvPr id="98" name="Straight Connector 97">
+            <a:extLst>
+              <a:ext uri="{FF2B5EF4-FFF2-40B4-BE49-F238E27FC236}">
+                <a16:creationId xmlns:a16="http://schemas.microsoft.com/office/drawing/2014/main" id="{02E51A95-1E59-4D32-B72F-3B9F3F4855F3}"/>
+              </a:ext>
+            </a:extLst>
+          </p:cNvPr>
+          <p:cNvCxnSpPr>
+            <a:cxnSpLocks/>
+          </p:cNvCxnSpPr>
+          <p:nvPr/>
+        </p:nvCxnSpPr>
+        <p:spPr>
+          <a:xfrm>
+            <a:off x="1748903" y="5221602"/>
+            <a:ext cx="1850081" cy="0"/>
+          </a:xfrm>
+          <a:prstGeom prst="line">
+            <a:avLst/>
+          </a:prstGeom>
+          <a:ln w="222250">
+            <a:solidFill>
+              <a:srgbClr val="3EF850"/>
+            </a:solidFill>
+          </a:ln>
+        </p:spPr>
+        <p:style>
+          <a:lnRef idx="1">
+            <a:schemeClr val="accent1"/>
+          </a:lnRef>
+          <a:fillRef idx="0">
+            <a:schemeClr val="accent1"/>
+          </a:fillRef>
+          <a:effectRef idx="0">
+            <a:schemeClr val="accent1"/>
+          </a:effectRef>
+          <a:fontRef idx="minor">
+            <a:schemeClr val="tx1"/>
+          </a:fontRef>
+        </p:style>
+      </p:cxnSp>
+      <p:cxnSp>
+        <p:nvCxnSpPr>
+          <p:cNvPr id="99" name="Straight Connector 98">
+            <a:extLst>
+              <a:ext uri="{FF2B5EF4-FFF2-40B4-BE49-F238E27FC236}">
+                <a16:creationId xmlns:a16="http://schemas.microsoft.com/office/drawing/2014/main" id="{0B76D92D-F0C6-44E3-A762-5C5DD9ECF586}"/>
+              </a:ext>
+            </a:extLst>
+          </p:cNvPr>
+          <p:cNvCxnSpPr>
+            <a:cxnSpLocks/>
+          </p:cNvCxnSpPr>
+          <p:nvPr/>
+        </p:nvCxnSpPr>
+        <p:spPr>
+          <a:xfrm flipV="1">
+            <a:off x="3489666" y="4344148"/>
+            <a:ext cx="0" cy="765717"/>
+          </a:xfrm>
+          <a:prstGeom prst="line">
+            <a:avLst/>
+          </a:prstGeom>
+          <a:ln w="222250">
+            <a:solidFill>
+              <a:srgbClr val="3EF850"/>
+            </a:solidFill>
+          </a:ln>
+        </p:spPr>
+        <p:style>
+          <a:lnRef idx="1">
+            <a:schemeClr val="accent1"/>
+          </a:lnRef>
+          <a:fillRef idx="0">
+            <a:schemeClr val="accent1"/>
+          </a:fillRef>
+          <a:effectRef idx="0">
+            <a:schemeClr val="accent1"/>
+          </a:effectRef>
+          <a:fontRef idx="minor">
+            <a:schemeClr val="tx1"/>
+          </a:fontRef>
+        </p:style>
+      </p:cxnSp>
+      <p:cxnSp>
+        <p:nvCxnSpPr>
+          <p:cNvPr id="100" name="Straight Connector 99">
+            <a:extLst>
+              <a:ext uri="{FF2B5EF4-FFF2-40B4-BE49-F238E27FC236}">
+                <a16:creationId xmlns:a16="http://schemas.microsoft.com/office/drawing/2014/main" id="{E2937AEE-FA59-4315-A5D7-1568A0D8E424}"/>
+              </a:ext>
+            </a:extLst>
+          </p:cNvPr>
+          <p:cNvCxnSpPr>
+            <a:cxnSpLocks/>
+          </p:cNvCxnSpPr>
+          <p:nvPr/>
+        </p:nvCxnSpPr>
+        <p:spPr>
+          <a:xfrm flipH="1">
+            <a:off x="1806572" y="4455164"/>
+            <a:ext cx="288773" cy="0"/>
+          </a:xfrm>
+          <a:prstGeom prst="line">
+            <a:avLst/>
+          </a:prstGeom>
+          <a:ln w="222250">
+            <a:solidFill>
+              <a:srgbClr val="3EF850"/>
+            </a:solidFill>
+          </a:ln>
+        </p:spPr>
+        <p:style>
+          <a:lnRef idx="1">
+            <a:schemeClr val="accent1"/>
+          </a:lnRef>
+          <a:fillRef idx="0">
+            <a:schemeClr val="accent1"/>
+          </a:fillRef>
+          <a:effectRef idx="0">
+            <a:schemeClr val="accent1"/>
+          </a:effectRef>
+          <a:fontRef idx="minor">
+            <a:schemeClr val="tx1"/>
+          </a:fontRef>
+        </p:style>
+      </p:cxnSp>
+      <p:cxnSp>
+        <p:nvCxnSpPr>
+          <p:cNvPr id="101" name="Straight Connector 100">
+            <a:extLst>
+              <a:ext uri="{FF2B5EF4-FFF2-40B4-BE49-F238E27FC236}">
+                <a16:creationId xmlns:a16="http://schemas.microsoft.com/office/drawing/2014/main" id="{D6A45039-EACC-468F-9D58-32A16ABEDB92}"/>
+              </a:ext>
+            </a:extLst>
+          </p:cNvPr>
+          <p:cNvCxnSpPr>
+            <a:cxnSpLocks/>
+          </p:cNvCxnSpPr>
+          <p:nvPr/>
+        </p:nvCxnSpPr>
+        <p:spPr>
+          <a:xfrm flipH="1">
+            <a:off x="3254725" y="4455164"/>
+            <a:ext cx="288773" cy="0"/>
+          </a:xfrm>
+          <a:prstGeom prst="line">
+            <a:avLst/>
+          </a:prstGeom>
+          <a:ln w="222250">
+            <a:solidFill>
+              <a:srgbClr val="3EF850"/>
+            </a:solidFill>
+          </a:ln>
+        </p:spPr>
+        <p:style>
+          <a:lnRef idx="1">
+            <a:schemeClr val="accent1"/>
+          </a:lnRef>
+          <a:fillRef idx="0">
+            <a:schemeClr val="accent1"/>
+          </a:fillRef>
+          <a:effectRef idx="0">
+            <a:schemeClr val="accent1"/>
+          </a:effectRef>
+          <a:fontRef idx="minor">
+            <a:schemeClr val="tx1"/>
+          </a:fontRef>
+        </p:style>
+      </p:cxnSp>
     </p:spTree>
     <p:extLst>
       <p:ext uri="{BB962C8B-B14F-4D97-AF65-F5344CB8AC3E}">

</xml_diff>

<commit_message>
Adding Shipping Form and Ship transaction.
</commit_message>
<xml_diff>
--- a/NFLWarehouse/NFLWarehouse/icons/Icons Design.pptx
+++ b/NFLWarehouse/NFLWarehouse/icons/Icons Design.pptx
@@ -264,7 +264,7 @@
           <a:p>
             <a:fld id="{E5C7EA15-A1A1-46A1-9F88-F45FB0CDCF01}" type="datetimeFigureOut">
               <a:rPr lang="en-US" smtClean="0"/>
-              <a:t>11/27/2021</a:t>
+              <a:t>11/28/2021</a:t>
             </a:fld>
             <a:endParaRPr lang="en-US"/>
           </a:p>
@@ -462,7 +462,7 @@
           <a:p>
             <a:fld id="{E5C7EA15-A1A1-46A1-9F88-F45FB0CDCF01}" type="datetimeFigureOut">
               <a:rPr lang="en-US" smtClean="0"/>
-              <a:t>11/27/2021</a:t>
+              <a:t>11/28/2021</a:t>
             </a:fld>
             <a:endParaRPr lang="en-US"/>
           </a:p>
@@ -670,7 +670,7 @@
           <a:p>
             <a:fld id="{E5C7EA15-A1A1-46A1-9F88-F45FB0CDCF01}" type="datetimeFigureOut">
               <a:rPr lang="en-US" smtClean="0"/>
-              <a:t>11/27/2021</a:t>
+              <a:t>11/28/2021</a:t>
             </a:fld>
             <a:endParaRPr lang="en-US"/>
           </a:p>
@@ -868,7 +868,7 @@
           <a:p>
             <a:fld id="{E5C7EA15-A1A1-46A1-9F88-F45FB0CDCF01}" type="datetimeFigureOut">
               <a:rPr lang="en-US" smtClean="0"/>
-              <a:t>11/27/2021</a:t>
+              <a:t>11/28/2021</a:t>
             </a:fld>
             <a:endParaRPr lang="en-US"/>
           </a:p>
@@ -1143,7 +1143,7 @@
           <a:p>
             <a:fld id="{E5C7EA15-A1A1-46A1-9F88-F45FB0CDCF01}" type="datetimeFigureOut">
               <a:rPr lang="en-US" smtClean="0"/>
-              <a:t>11/27/2021</a:t>
+              <a:t>11/28/2021</a:t>
             </a:fld>
             <a:endParaRPr lang="en-US"/>
           </a:p>
@@ -1408,7 +1408,7 @@
           <a:p>
             <a:fld id="{E5C7EA15-A1A1-46A1-9F88-F45FB0CDCF01}" type="datetimeFigureOut">
               <a:rPr lang="en-US" smtClean="0"/>
-              <a:t>11/27/2021</a:t>
+              <a:t>11/28/2021</a:t>
             </a:fld>
             <a:endParaRPr lang="en-US"/>
           </a:p>
@@ -1820,7 +1820,7 @@
           <a:p>
             <a:fld id="{E5C7EA15-A1A1-46A1-9F88-F45FB0CDCF01}" type="datetimeFigureOut">
               <a:rPr lang="en-US" smtClean="0"/>
-              <a:t>11/27/2021</a:t>
+              <a:t>11/28/2021</a:t>
             </a:fld>
             <a:endParaRPr lang="en-US"/>
           </a:p>
@@ -1961,7 +1961,7 @@
           <a:p>
             <a:fld id="{E5C7EA15-A1A1-46A1-9F88-F45FB0CDCF01}" type="datetimeFigureOut">
               <a:rPr lang="en-US" smtClean="0"/>
-              <a:t>11/27/2021</a:t>
+              <a:t>11/28/2021</a:t>
             </a:fld>
             <a:endParaRPr lang="en-US"/>
           </a:p>
@@ -2074,7 +2074,7 @@
           <a:p>
             <a:fld id="{E5C7EA15-A1A1-46A1-9F88-F45FB0CDCF01}" type="datetimeFigureOut">
               <a:rPr lang="en-US" smtClean="0"/>
-              <a:t>11/27/2021</a:t>
+              <a:t>11/28/2021</a:t>
             </a:fld>
             <a:endParaRPr lang="en-US"/>
           </a:p>
@@ -2385,7 +2385,7 @@
           <a:p>
             <a:fld id="{E5C7EA15-A1A1-46A1-9F88-F45FB0CDCF01}" type="datetimeFigureOut">
               <a:rPr lang="en-US" smtClean="0"/>
-              <a:t>11/27/2021</a:t>
+              <a:t>11/28/2021</a:t>
             </a:fld>
             <a:endParaRPr lang="en-US"/>
           </a:p>
@@ -2673,7 +2673,7 @@
           <a:p>
             <a:fld id="{E5C7EA15-A1A1-46A1-9F88-F45FB0CDCF01}" type="datetimeFigureOut">
               <a:rPr lang="en-US" smtClean="0"/>
-              <a:t>11/27/2021</a:t>
+              <a:t>11/28/2021</a:t>
             </a:fld>
             <a:endParaRPr lang="en-US"/>
           </a:p>
@@ -2914,7 +2914,7 @@
           <a:p>
             <a:fld id="{E5C7EA15-A1A1-46A1-9F88-F45FB0CDCF01}" type="datetimeFigureOut">
               <a:rPr lang="en-US" smtClean="0"/>
-              <a:t>11/27/2021</a:t>
+              <a:t>11/28/2021</a:t>
             </a:fld>
             <a:endParaRPr lang="en-US"/>
           </a:p>
@@ -3347,7 +3347,7 @@
         </p:nvSpPr>
         <p:spPr>
           <a:xfrm>
-            <a:off x="1496443" y="472458"/>
+            <a:off x="295716" y="537112"/>
             <a:ext cx="2368395" cy="2369248"/>
           </a:xfrm>
           <a:prstGeom prst="rect">
@@ -3401,7 +3401,7 @@
         </p:nvSpPr>
         <p:spPr>
           <a:xfrm>
-            <a:off x="4249168" y="472458"/>
+            <a:off x="3048441" y="537112"/>
             <a:ext cx="2368395" cy="2369248"/>
           </a:xfrm>
           <a:prstGeom prst="rect">
@@ -3455,7 +3455,7 @@
         </p:nvCxnSpPr>
         <p:spPr>
           <a:xfrm>
-            <a:off x="4598263" y="769620"/>
+            <a:off x="3397536" y="834274"/>
             <a:ext cx="1687590" cy="1701800"/>
           </a:xfrm>
           <a:prstGeom prst="line">
@@ -3498,7 +3498,7 @@
         </p:nvSpPr>
         <p:spPr>
           <a:xfrm>
-            <a:off x="4542777" y="732783"/>
+            <a:off x="3342050" y="797437"/>
             <a:ext cx="1781175" cy="1781817"/>
           </a:xfrm>
           <a:prstGeom prst="rect">
@@ -3554,7 +3554,7 @@
         </p:nvSpPr>
         <p:spPr>
           <a:xfrm>
-            <a:off x="7001893" y="472458"/>
+            <a:off x="5801166" y="537112"/>
             <a:ext cx="2368395" cy="2369248"/>
           </a:xfrm>
           <a:prstGeom prst="rect">
@@ -3607,14 +3607,14 @@
           <p:nvPr/>
         </p:nvCxnSpPr>
         <p:spPr>
-          <a:xfrm flipH="1">
-            <a:off x="4584928" y="773430"/>
-            <a:ext cx="1697115" cy="1697990"/>
+          <a:xfrm flipH="1" flipV="1">
+            <a:off x="10101174" y="1233316"/>
+            <a:ext cx="451834" cy="569877"/>
           </a:xfrm>
           <a:prstGeom prst="line">
             <a:avLst/>
           </a:prstGeom>
-          <a:ln w="222250">
+          <a:ln w="57150">
             <a:solidFill>
               <a:srgbClr val="3EF850"/>
             </a:solidFill>
@@ -3651,7 +3651,7 @@
         </p:nvSpPr>
         <p:spPr>
           <a:xfrm>
-            <a:off x="7718292" y="1152627"/>
+            <a:off x="6517565" y="1217281"/>
             <a:ext cx="938557" cy="938896"/>
           </a:xfrm>
           <a:prstGeom prst="rect">
@@ -3703,7 +3703,7 @@
         </p:nvGrpSpPr>
         <p:grpSpPr>
           <a:xfrm>
-            <a:off x="7259307" y="694543"/>
+            <a:off x="6058580" y="759197"/>
             <a:ext cx="688650" cy="688650"/>
             <a:chOff x="6966344" y="1608943"/>
             <a:chExt cx="688650" cy="688650"/>
@@ -3810,7 +3810,7 @@
         </p:nvGrpSpPr>
         <p:grpSpPr>
           <a:xfrm rot="5400000">
-            <a:off x="8424678" y="694543"/>
+            <a:off x="7223951" y="759197"/>
             <a:ext cx="688650" cy="688650"/>
             <a:chOff x="6966344" y="1608943"/>
             <a:chExt cx="688650" cy="688650"/>
@@ -3917,7 +3917,7 @@
         </p:nvGrpSpPr>
         <p:grpSpPr>
           <a:xfrm rot="10800000">
-            <a:off x="8417783" y="1862684"/>
+            <a:off x="7217056" y="1927338"/>
             <a:ext cx="688650" cy="688650"/>
             <a:chOff x="6966344" y="1608943"/>
             <a:chExt cx="688650" cy="688650"/>
@@ -4024,7 +4024,7 @@
         </p:nvGrpSpPr>
         <p:grpSpPr>
           <a:xfrm rot="16200000">
-            <a:off x="7258121" y="1863367"/>
+            <a:off x="6057394" y="1928021"/>
             <a:ext cx="688650" cy="688650"/>
             <a:chOff x="6966344" y="1608943"/>
             <a:chExt cx="688650" cy="688650"/>
@@ -4133,7 +4133,7 @@
         </p:nvSpPr>
         <p:spPr>
           <a:xfrm>
-            <a:off x="7291495" y="727804"/>
+            <a:off x="6090768" y="792458"/>
             <a:ext cx="1781175" cy="1781817"/>
           </a:xfrm>
           <a:prstGeom prst="rect">
@@ -4189,7 +4189,7 @@
         </p:nvSpPr>
         <p:spPr>
           <a:xfrm>
-            <a:off x="1780527" y="732783"/>
+            <a:off x="579800" y="797437"/>
             <a:ext cx="1781175" cy="1781817"/>
           </a:xfrm>
           <a:prstGeom prst="rect">
@@ -4245,7 +4245,7 @@
         </p:nvSpPr>
         <p:spPr>
           <a:xfrm>
-            <a:off x="7001893" y="3261079"/>
+            <a:off x="5801166" y="3325733"/>
             <a:ext cx="2368395" cy="2369248"/>
           </a:xfrm>
           <a:prstGeom prst="rect">
@@ -4299,7 +4299,7 @@
         </p:nvSpPr>
         <p:spPr>
           <a:xfrm>
-            <a:off x="7718292" y="3941248"/>
+            <a:off x="6517565" y="4005902"/>
             <a:ext cx="938557" cy="938896"/>
           </a:xfrm>
           <a:prstGeom prst="rect">
@@ -4351,7 +4351,7 @@
         </p:nvGrpSpPr>
         <p:grpSpPr>
           <a:xfrm>
-            <a:off x="7259307" y="3483164"/>
+            <a:off x="6058580" y="3547818"/>
             <a:ext cx="688650" cy="688650"/>
             <a:chOff x="6966344" y="1608943"/>
             <a:chExt cx="688650" cy="688650"/>
@@ -4458,7 +4458,7 @@
         </p:nvGrpSpPr>
         <p:grpSpPr>
           <a:xfrm rot="16200000">
-            <a:off x="7258121" y="4651988"/>
+            <a:off x="6057394" y="4716642"/>
             <a:ext cx="688650" cy="688650"/>
             <a:chOff x="6966344" y="1608943"/>
             <a:chExt cx="688650" cy="688650"/>
@@ -4567,7 +4567,7 @@
         </p:nvSpPr>
         <p:spPr>
           <a:xfrm>
-            <a:off x="7291495" y="3516425"/>
+            <a:off x="6090768" y="3581079"/>
             <a:ext cx="1781175" cy="1781817"/>
           </a:xfrm>
           <a:prstGeom prst="rect">
@@ -4623,7 +4623,7 @@
         </p:nvCxnSpPr>
         <p:spPr>
           <a:xfrm>
-            <a:off x="1780527" y="1618712"/>
+            <a:off x="579800" y="1683366"/>
             <a:ext cx="1781175" cy="0"/>
           </a:xfrm>
           <a:prstGeom prst="line">
@@ -4666,7 +4666,7 @@
         </p:nvSpPr>
         <p:spPr>
           <a:xfrm>
-            <a:off x="4249168" y="3261079"/>
+            <a:off x="3048441" y="3325733"/>
             <a:ext cx="2368395" cy="2369248"/>
           </a:xfrm>
           <a:prstGeom prst="rect">
@@ -4720,7 +4720,7 @@
         </p:nvSpPr>
         <p:spPr>
           <a:xfrm>
-            <a:off x="4533252" y="3521404"/>
+            <a:off x="3332525" y="3586058"/>
             <a:ext cx="1781175" cy="1781817"/>
           </a:xfrm>
           <a:prstGeom prst="rect">
@@ -4776,7 +4776,7 @@
         </p:nvCxnSpPr>
         <p:spPr>
           <a:xfrm>
-            <a:off x="4827554" y="4852814"/>
+            <a:off x="3626827" y="4917468"/>
             <a:ext cx="255091" cy="0"/>
           </a:xfrm>
           <a:prstGeom prst="line">
@@ -4819,7 +4819,7 @@
         </p:nvCxnSpPr>
         <p:spPr>
           <a:xfrm>
-            <a:off x="5149980" y="4856200"/>
+            <a:off x="3949253" y="4920854"/>
             <a:ext cx="255091" cy="0"/>
           </a:xfrm>
           <a:prstGeom prst="line">
@@ -4862,7 +4862,7 @@
         </p:nvCxnSpPr>
         <p:spPr>
           <a:xfrm>
-            <a:off x="5470172" y="4853747"/>
+            <a:off x="4269445" y="4918401"/>
             <a:ext cx="255091" cy="0"/>
           </a:xfrm>
           <a:prstGeom prst="line">
@@ -4905,7 +4905,7 @@
         </p:nvCxnSpPr>
         <p:spPr>
           <a:xfrm>
-            <a:off x="5785306" y="4856200"/>
+            <a:off x="4584579" y="4920854"/>
             <a:ext cx="255091" cy="0"/>
           </a:xfrm>
           <a:prstGeom prst="line">
@@ -4946,7 +4946,7 @@
         </p:nvGrpSpPr>
         <p:grpSpPr>
           <a:xfrm flipV="1">
-            <a:off x="4903922" y="3525221"/>
+            <a:off x="3703195" y="3589875"/>
             <a:ext cx="1106555" cy="836589"/>
             <a:chOff x="4830034" y="3645291"/>
             <a:chExt cx="1106555" cy="836589"/>
@@ -5064,7 +5064,7 @@
         </p:nvCxnSpPr>
         <p:spPr>
           <a:xfrm flipV="1">
-            <a:off x="4607788" y="4355846"/>
+            <a:off x="3407061" y="4420500"/>
             <a:ext cx="0" cy="765717"/>
           </a:xfrm>
           <a:prstGeom prst="line">
@@ -5107,7 +5107,7 @@
         </p:nvCxnSpPr>
         <p:spPr>
           <a:xfrm>
-            <a:off x="4497705" y="5232533"/>
+            <a:off x="3296978" y="5297187"/>
             <a:ext cx="1850081" cy="0"/>
           </a:xfrm>
           <a:prstGeom prst="line">
@@ -5150,7 +5150,7 @@
         </p:nvCxnSpPr>
         <p:spPr>
           <a:xfrm flipV="1">
-            <a:off x="6238468" y="4355079"/>
+            <a:off x="5037741" y="4419733"/>
             <a:ext cx="0" cy="765717"/>
           </a:xfrm>
           <a:prstGeom prst="line">
@@ -5193,7 +5193,7 @@
         </p:nvCxnSpPr>
         <p:spPr>
           <a:xfrm flipH="1">
-            <a:off x="4555374" y="4466095"/>
+            <a:off x="3354647" y="4530749"/>
             <a:ext cx="288773" cy="0"/>
           </a:xfrm>
           <a:prstGeom prst="line">
@@ -5236,7 +5236,7 @@
         </p:nvCxnSpPr>
         <p:spPr>
           <a:xfrm flipH="1">
-            <a:off x="6003527" y="4466095"/>
+            <a:off x="4802800" y="4530749"/>
             <a:ext cx="288773" cy="0"/>
           </a:xfrm>
           <a:prstGeom prst="line">
@@ -5279,7 +5279,7 @@
         </p:nvSpPr>
         <p:spPr>
           <a:xfrm>
-            <a:off x="1500366" y="3250148"/>
+            <a:off x="299639" y="3314802"/>
             <a:ext cx="2368395" cy="2369248"/>
           </a:xfrm>
           <a:prstGeom prst="rect">
@@ -5333,7 +5333,7 @@
         </p:nvSpPr>
         <p:spPr>
           <a:xfrm>
-            <a:off x="1784450" y="3510473"/>
+            <a:off x="583723" y="3575127"/>
             <a:ext cx="1781175" cy="1781817"/>
           </a:xfrm>
           <a:prstGeom prst="rect">
@@ -5389,7 +5389,7 @@
         </p:nvCxnSpPr>
         <p:spPr>
           <a:xfrm>
-            <a:off x="2078752" y="4841883"/>
+            <a:off x="878025" y="4906537"/>
             <a:ext cx="255091" cy="0"/>
           </a:xfrm>
           <a:prstGeom prst="line">
@@ -5432,7 +5432,7 @@
         </p:nvCxnSpPr>
         <p:spPr>
           <a:xfrm>
-            <a:off x="2401178" y="4845269"/>
+            <a:off x="1200451" y="4909923"/>
             <a:ext cx="255091" cy="0"/>
           </a:xfrm>
           <a:prstGeom prst="line">
@@ -5475,7 +5475,7 @@
         </p:nvCxnSpPr>
         <p:spPr>
           <a:xfrm>
-            <a:off x="2721370" y="4842816"/>
+            <a:off x="1520643" y="4907470"/>
             <a:ext cx="255091" cy="0"/>
           </a:xfrm>
           <a:prstGeom prst="line">
@@ -5518,7 +5518,7 @@
         </p:nvCxnSpPr>
         <p:spPr>
           <a:xfrm>
-            <a:off x="3036504" y="4845269"/>
+            <a:off x="1835777" y="4909923"/>
             <a:ext cx="255091" cy="0"/>
           </a:xfrm>
           <a:prstGeom prst="line">
@@ -5559,7 +5559,7 @@
         </p:nvGrpSpPr>
         <p:grpSpPr>
           <a:xfrm>
-            <a:off x="2155120" y="3514290"/>
+            <a:off x="954393" y="3578944"/>
             <a:ext cx="1106555" cy="836589"/>
             <a:chOff x="4830034" y="3645291"/>
             <a:chExt cx="1106555" cy="836589"/>
@@ -5677,7 +5677,7 @@
         </p:nvCxnSpPr>
         <p:spPr>
           <a:xfrm flipV="1">
-            <a:off x="1858986" y="4344915"/>
+            <a:off x="658259" y="4409569"/>
             <a:ext cx="0" cy="765717"/>
           </a:xfrm>
           <a:prstGeom prst="line">
@@ -5720,7 +5720,7 @@
         </p:nvCxnSpPr>
         <p:spPr>
           <a:xfrm>
-            <a:off x="1748903" y="5221602"/>
+            <a:off x="548176" y="5286256"/>
             <a:ext cx="1850081" cy="0"/>
           </a:xfrm>
           <a:prstGeom prst="line">
@@ -5763,7 +5763,7 @@
         </p:nvCxnSpPr>
         <p:spPr>
           <a:xfrm flipV="1">
-            <a:off x="3489666" y="4344148"/>
+            <a:off x="2288939" y="4408802"/>
             <a:ext cx="0" cy="765717"/>
           </a:xfrm>
           <a:prstGeom prst="line">
@@ -5806,7 +5806,7 @@
         </p:nvCxnSpPr>
         <p:spPr>
           <a:xfrm flipH="1">
-            <a:off x="1806572" y="4455164"/>
+            <a:off x="605845" y="4519818"/>
             <a:ext cx="288773" cy="0"/>
           </a:xfrm>
           <a:prstGeom prst="line">
@@ -5849,13 +5849,637 @@
         </p:nvCxnSpPr>
         <p:spPr>
           <a:xfrm flipH="1">
-            <a:off x="3254725" y="4455164"/>
+            <a:off x="2053998" y="4519818"/>
             <a:ext cx="288773" cy="0"/>
           </a:xfrm>
           <a:prstGeom prst="line">
             <a:avLst/>
           </a:prstGeom>
           <a:ln w="222250">
+            <a:solidFill>
+              <a:srgbClr val="3EF850"/>
+            </a:solidFill>
+          </a:ln>
+        </p:spPr>
+        <p:style>
+          <a:lnRef idx="1">
+            <a:schemeClr val="accent1"/>
+          </a:lnRef>
+          <a:fillRef idx="0">
+            <a:schemeClr val="accent1"/>
+          </a:fillRef>
+          <a:effectRef idx="0">
+            <a:schemeClr val="accent1"/>
+          </a:effectRef>
+          <a:fontRef idx="minor">
+            <a:schemeClr val="tx1"/>
+          </a:fontRef>
+        </p:style>
+      </p:cxnSp>
+      <p:sp>
+        <p:nvSpPr>
+          <p:cNvPr id="61" name="Rectangle 60">
+            <a:extLst>
+              <a:ext uri="{FF2B5EF4-FFF2-40B4-BE49-F238E27FC236}">
+                <a16:creationId xmlns:a16="http://schemas.microsoft.com/office/drawing/2014/main" id="{923B9EA3-7BAA-40A9-AF3B-9F12B3ED2CA0}"/>
+              </a:ext>
+            </a:extLst>
+          </p:cNvPr>
+          <p:cNvSpPr>
+            <a:spLocks noChangeAspect="1"/>
+          </p:cNvSpPr>
+          <p:nvPr/>
+        </p:nvSpPr>
+        <p:spPr>
+          <a:xfrm>
+            <a:off x="8459163" y="537112"/>
+            <a:ext cx="2368395" cy="2369248"/>
+          </a:xfrm>
+          <a:prstGeom prst="rect">
+            <a:avLst/>
+          </a:prstGeom>
+          <a:noFill/>
+          <a:ln w="76200">
+            <a:solidFill>
+              <a:srgbClr val="3EF850"/>
+            </a:solidFill>
+          </a:ln>
+        </p:spPr>
+        <p:style>
+          <a:lnRef idx="2">
+            <a:schemeClr val="accent1">
+              <a:shade val="50000"/>
+            </a:schemeClr>
+          </a:lnRef>
+          <a:fillRef idx="1">
+            <a:schemeClr val="accent1"/>
+          </a:fillRef>
+          <a:effectRef idx="0">
+            <a:schemeClr val="accent1"/>
+          </a:effectRef>
+          <a:fontRef idx="minor">
+            <a:schemeClr val="lt1"/>
+          </a:fontRef>
+        </p:style>
+        <p:txBody>
+          <a:bodyPr rtlCol="0" anchor="ctr"/>
+          <a:lstStyle/>
+          <a:p>
+            <a:pPr algn="ctr"/>
+            <a:endParaRPr lang="en-US"/>
+          </a:p>
+        </p:txBody>
+      </p:sp>
+      <p:sp>
+        <p:nvSpPr>
+          <p:cNvPr id="106" name="Rectangle 105">
+            <a:extLst>
+              <a:ext uri="{FF2B5EF4-FFF2-40B4-BE49-F238E27FC236}">
+                <a16:creationId xmlns:a16="http://schemas.microsoft.com/office/drawing/2014/main" id="{B536FD46-4309-472A-9537-082D99F5E5D6}"/>
+              </a:ext>
+            </a:extLst>
+          </p:cNvPr>
+          <p:cNvSpPr>
+            <a:spLocks noChangeAspect="1"/>
+          </p:cNvSpPr>
+          <p:nvPr/>
+        </p:nvSpPr>
+        <p:spPr>
+          <a:xfrm>
+            <a:off x="8748765" y="792458"/>
+            <a:ext cx="1781175" cy="1781817"/>
+          </a:xfrm>
+          <a:prstGeom prst="rect">
+            <a:avLst/>
+          </a:prstGeom>
+          <a:noFill/>
+          <a:ln w="76200">
+            <a:solidFill>
+              <a:srgbClr val="3EF850">
+                <a:alpha val="20000"/>
+              </a:srgbClr>
+            </a:solidFill>
+          </a:ln>
+        </p:spPr>
+        <p:style>
+          <a:lnRef idx="2">
+            <a:schemeClr val="accent1">
+              <a:shade val="50000"/>
+            </a:schemeClr>
+          </a:lnRef>
+          <a:fillRef idx="1">
+            <a:schemeClr val="accent1"/>
+          </a:fillRef>
+          <a:effectRef idx="0">
+            <a:schemeClr val="accent1"/>
+          </a:effectRef>
+          <a:fontRef idx="minor">
+            <a:schemeClr val="lt1"/>
+          </a:fontRef>
+        </p:style>
+        <p:txBody>
+          <a:bodyPr rtlCol="0" anchor="ctr"/>
+          <a:lstStyle/>
+          <a:p>
+            <a:pPr algn="ctr"/>
+            <a:endParaRPr lang="en-US"/>
+          </a:p>
+        </p:txBody>
+      </p:sp>
+      <p:sp>
+        <p:nvSpPr>
+          <p:cNvPr id="2" name="Rectangle: Rounded Corners 1">
+            <a:extLst>
+              <a:ext uri="{FF2B5EF4-FFF2-40B4-BE49-F238E27FC236}">
+                <a16:creationId xmlns:a16="http://schemas.microsoft.com/office/drawing/2014/main" id="{0C92F285-798C-45E9-B253-6269BEB5096A}"/>
+              </a:ext>
+            </a:extLst>
+          </p:cNvPr>
+          <p:cNvSpPr/>
+          <p:nvPr/>
+        </p:nvSpPr>
+        <p:spPr>
+          <a:xfrm>
+            <a:off x="8723297" y="1001488"/>
+            <a:ext cx="1073483" cy="1438741"/>
+          </a:xfrm>
+          <a:prstGeom prst="roundRect">
+            <a:avLst>
+              <a:gd name="adj" fmla="val 11236"/>
+            </a:avLst>
+          </a:prstGeom>
+          <a:solidFill>
+            <a:srgbClr val="3EF850"/>
+          </a:solidFill>
+          <a:ln>
+            <a:noFill/>
+          </a:ln>
+        </p:spPr>
+        <p:style>
+          <a:lnRef idx="2">
+            <a:schemeClr val="accent1">
+              <a:shade val="50000"/>
+            </a:schemeClr>
+          </a:lnRef>
+          <a:fillRef idx="1">
+            <a:schemeClr val="accent1"/>
+          </a:fillRef>
+          <a:effectRef idx="0">
+            <a:schemeClr val="accent1"/>
+          </a:effectRef>
+          <a:fontRef idx="minor">
+            <a:schemeClr val="lt1"/>
+          </a:fontRef>
+        </p:style>
+        <p:txBody>
+          <a:bodyPr rtlCol="0" anchor="ctr"/>
+          <a:lstStyle/>
+          <a:p>
+            <a:pPr algn="ctr"/>
+            <a:endParaRPr lang="en-US"/>
+          </a:p>
+        </p:txBody>
+      </p:sp>
+      <p:sp>
+        <p:nvSpPr>
+          <p:cNvPr id="3" name="Chord 2">
+            <a:extLst>
+              <a:ext uri="{FF2B5EF4-FFF2-40B4-BE49-F238E27FC236}">
+                <a16:creationId xmlns:a16="http://schemas.microsoft.com/office/drawing/2014/main" id="{28F78739-8861-4F39-A76D-EE748D6482D3}"/>
+              </a:ext>
+            </a:extLst>
+          </p:cNvPr>
+          <p:cNvSpPr/>
+          <p:nvPr/>
+        </p:nvSpPr>
+        <p:spPr>
+          <a:xfrm rot="5400000">
+            <a:off x="8826954" y="2139928"/>
+            <a:ext cx="607775" cy="552930"/>
+          </a:xfrm>
+          <a:prstGeom prst="chord">
+            <a:avLst>
+              <a:gd name="adj1" fmla="val 5049704"/>
+              <a:gd name="adj2" fmla="val 16545416"/>
+            </a:avLst>
+          </a:prstGeom>
+          <a:solidFill>
+            <a:schemeClr val="bg1"/>
+          </a:solidFill>
+          <a:ln>
+            <a:noFill/>
+          </a:ln>
+        </p:spPr>
+        <p:style>
+          <a:lnRef idx="2">
+            <a:schemeClr val="accent1">
+              <a:shade val="50000"/>
+            </a:schemeClr>
+          </a:lnRef>
+          <a:fillRef idx="1">
+            <a:schemeClr val="accent1"/>
+          </a:fillRef>
+          <a:effectRef idx="0">
+            <a:schemeClr val="accent1"/>
+          </a:effectRef>
+          <a:fontRef idx="minor">
+            <a:schemeClr val="lt1"/>
+          </a:fontRef>
+        </p:style>
+        <p:txBody>
+          <a:bodyPr rtlCol="0" anchor="ctr"/>
+          <a:lstStyle/>
+          <a:p>
+            <a:pPr algn="ctr"/>
+            <a:endParaRPr lang="en-US"/>
+          </a:p>
+        </p:txBody>
+      </p:sp>
+      <p:sp>
+        <p:nvSpPr>
+          <p:cNvPr id="5" name="Oval 4">
+            <a:extLst>
+              <a:ext uri="{FF2B5EF4-FFF2-40B4-BE49-F238E27FC236}">
+                <a16:creationId xmlns:a16="http://schemas.microsoft.com/office/drawing/2014/main" id="{FA80EF41-319A-4478-9E43-4F2CF4EDD63F}"/>
+              </a:ext>
+            </a:extLst>
+          </p:cNvPr>
+          <p:cNvSpPr/>
+          <p:nvPr/>
+        </p:nvSpPr>
+        <p:spPr>
+          <a:xfrm>
+            <a:off x="8898537" y="2156177"/>
+            <a:ext cx="471070" cy="451048"/>
+          </a:xfrm>
+          <a:prstGeom prst="ellipse">
+            <a:avLst/>
+          </a:prstGeom>
+          <a:solidFill>
+            <a:srgbClr val="3EF850"/>
+          </a:solidFill>
+          <a:ln>
+            <a:noFill/>
+          </a:ln>
+        </p:spPr>
+        <p:style>
+          <a:lnRef idx="2">
+            <a:schemeClr val="accent1">
+              <a:shade val="50000"/>
+            </a:schemeClr>
+          </a:lnRef>
+          <a:fillRef idx="1">
+            <a:schemeClr val="accent1"/>
+          </a:fillRef>
+          <a:effectRef idx="0">
+            <a:schemeClr val="accent1"/>
+          </a:effectRef>
+          <a:fontRef idx="minor">
+            <a:schemeClr val="lt1"/>
+          </a:fontRef>
+        </p:style>
+        <p:txBody>
+          <a:bodyPr rtlCol="0" anchor="ctr"/>
+          <a:lstStyle/>
+          <a:p>
+            <a:pPr algn="ctr"/>
+            <a:endParaRPr lang="en-US"/>
+          </a:p>
+        </p:txBody>
+      </p:sp>
+      <p:sp>
+        <p:nvSpPr>
+          <p:cNvPr id="7" name="Rectangle 6">
+            <a:extLst>
+              <a:ext uri="{FF2B5EF4-FFF2-40B4-BE49-F238E27FC236}">
+                <a16:creationId xmlns:a16="http://schemas.microsoft.com/office/drawing/2014/main" id="{EDD6A3BB-A069-406A-ABCC-C294B2DA031C}"/>
+              </a:ext>
+            </a:extLst>
+          </p:cNvPr>
+          <p:cNvSpPr/>
+          <p:nvPr/>
+        </p:nvSpPr>
+        <p:spPr>
+          <a:xfrm>
+            <a:off x="9659209" y="1779951"/>
+            <a:ext cx="914029" cy="660278"/>
+          </a:xfrm>
+          <a:prstGeom prst="rect">
+            <a:avLst/>
+          </a:prstGeom>
+          <a:solidFill>
+            <a:srgbClr val="3EF850"/>
+          </a:solidFill>
+          <a:ln>
+            <a:noFill/>
+          </a:ln>
+        </p:spPr>
+        <p:style>
+          <a:lnRef idx="2">
+            <a:schemeClr val="accent1">
+              <a:shade val="50000"/>
+            </a:schemeClr>
+          </a:lnRef>
+          <a:fillRef idx="1">
+            <a:schemeClr val="accent1"/>
+          </a:fillRef>
+          <a:effectRef idx="0">
+            <a:schemeClr val="accent1"/>
+          </a:effectRef>
+          <a:fontRef idx="minor">
+            <a:schemeClr val="lt1"/>
+          </a:fontRef>
+        </p:style>
+        <p:txBody>
+          <a:bodyPr rtlCol="0" anchor="ctr"/>
+          <a:lstStyle/>
+          <a:p>
+            <a:pPr algn="ctr"/>
+            <a:endParaRPr lang="en-US"/>
+          </a:p>
+        </p:txBody>
+      </p:sp>
+      <p:sp>
+        <p:nvSpPr>
+          <p:cNvPr id="110" name="Chord 109">
+            <a:extLst>
+              <a:ext uri="{FF2B5EF4-FFF2-40B4-BE49-F238E27FC236}">
+                <a16:creationId xmlns:a16="http://schemas.microsoft.com/office/drawing/2014/main" id="{F701D95C-6EB2-4CFB-A5D6-6B8229F60EAA}"/>
+              </a:ext>
+            </a:extLst>
+          </p:cNvPr>
+          <p:cNvSpPr/>
+          <p:nvPr/>
+        </p:nvSpPr>
+        <p:spPr>
+          <a:xfrm rot="5400000">
+            <a:off x="9764746" y="2139926"/>
+            <a:ext cx="607775" cy="552930"/>
+          </a:xfrm>
+          <a:prstGeom prst="chord">
+            <a:avLst>
+              <a:gd name="adj1" fmla="val 5049704"/>
+              <a:gd name="adj2" fmla="val 16545416"/>
+            </a:avLst>
+          </a:prstGeom>
+          <a:solidFill>
+            <a:schemeClr val="bg1"/>
+          </a:solidFill>
+          <a:ln>
+            <a:noFill/>
+          </a:ln>
+        </p:spPr>
+        <p:style>
+          <a:lnRef idx="2">
+            <a:schemeClr val="accent1">
+              <a:shade val="50000"/>
+            </a:schemeClr>
+          </a:lnRef>
+          <a:fillRef idx="1">
+            <a:schemeClr val="accent1"/>
+          </a:fillRef>
+          <a:effectRef idx="0">
+            <a:schemeClr val="accent1"/>
+          </a:effectRef>
+          <a:fontRef idx="minor">
+            <a:schemeClr val="lt1"/>
+          </a:fontRef>
+        </p:style>
+        <p:txBody>
+          <a:bodyPr rtlCol="0" anchor="ctr"/>
+          <a:lstStyle/>
+          <a:p>
+            <a:pPr algn="ctr"/>
+            <a:endParaRPr lang="en-US"/>
+          </a:p>
+        </p:txBody>
+      </p:sp>
+      <p:sp>
+        <p:nvSpPr>
+          <p:cNvPr id="111" name="Oval 110">
+            <a:extLst>
+              <a:ext uri="{FF2B5EF4-FFF2-40B4-BE49-F238E27FC236}">
+                <a16:creationId xmlns:a16="http://schemas.microsoft.com/office/drawing/2014/main" id="{8FA2CF66-6044-41A7-ADE8-BB2E103B821B}"/>
+              </a:ext>
+            </a:extLst>
+          </p:cNvPr>
+          <p:cNvSpPr/>
+          <p:nvPr/>
+        </p:nvSpPr>
+        <p:spPr>
+          <a:xfrm>
+            <a:off x="9835467" y="2156177"/>
+            <a:ext cx="471070" cy="451048"/>
+          </a:xfrm>
+          <a:prstGeom prst="ellipse">
+            <a:avLst/>
+          </a:prstGeom>
+          <a:solidFill>
+            <a:srgbClr val="3EF850"/>
+          </a:solidFill>
+          <a:ln>
+            <a:noFill/>
+          </a:ln>
+        </p:spPr>
+        <p:style>
+          <a:lnRef idx="2">
+            <a:schemeClr val="accent1">
+              <a:shade val="50000"/>
+            </a:schemeClr>
+          </a:lnRef>
+          <a:fillRef idx="1">
+            <a:schemeClr val="accent1"/>
+          </a:fillRef>
+          <a:effectRef idx="0">
+            <a:schemeClr val="accent1"/>
+          </a:effectRef>
+          <a:fontRef idx="minor">
+            <a:schemeClr val="lt1"/>
+          </a:fontRef>
+        </p:style>
+        <p:txBody>
+          <a:bodyPr rtlCol="0" anchor="ctr"/>
+          <a:lstStyle/>
+          <a:p>
+            <a:pPr algn="ctr"/>
+            <a:endParaRPr lang="en-US"/>
+          </a:p>
+        </p:txBody>
+      </p:sp>
+      <p:pic>
+        <p:nvPicPr>
+          <p:cNvPr id="15" name="Picture 14">
+            <a:extLst>
+              <a:ext uri="{FF2B5EF4-FFF2-40B4-BE49-F238E27FC236}">
+                <a16:creationId xmlns:a16="http://schemas.microsoft.com/office/drawing/2014/main" id="{887EB9CC-74FE-4630-949E-F2ABEA8E7CAB}"/>
+              </a:ext>
+            </a:extLst>
+          </p:cNvPr>
+          <p:cNvPicPr>
+            <a:picLocks noChangeAspect="1"/>
+          </p:cNvPicPr>
+          <p:nvPr/>
+        </p:nvPicPr>
+        <p:blipFill>
+          <a:blip r:embed="rId2">
+            <a:clrChange>
+              <a:clrFrom>
+                <a:srgbClr val="FFFFFF"/>
+              </a:clrFrom>
+              <a:clrTo>
+                <a:srgbClr val="FFFFFF">
+                  <a:alpha val="0"/>
+                </a:srgbClr>
+              </a:clrTo>
+            </a:clrChange>
+          </a:blip>
+          <a:stretch>
+            <a:fillRect/>
+          </a:stretch>
+        </p:blipFill>
+        <p:spPr>
+          <a:xfrm>
+            <a:off x="8670924" y="3792742"/>
+            <a:ext cx="1920141" cy="1639220"/>
+          </a:xfrm>
+          <a:prstGeom prst="rect">
+            <a:avLst/>
+          </a:prstGeom>
+        </p:spPr>
+      </p:pic>
+      <p:sp>
+        <p:nvSpPr>
+          <p:cNvPr id="133" name="Rectangle 132">
+            <a:extLst>
+              <a:ext uri="{FF2B5EF4-FFF2-40B4-BE49-F238E27FC236}">
+                <a16:creationId xmlns:a16="http://schemas.microsoft.com/office/drawing/2014/main" id="{29CDAEC4-8CD2-4D1F-A8F1-CF8F45E4364A}"/>
+              </a:ext>
+            </a:extLst>
+          </p:cNvPr>
+          <p:cNvSpPr>
+            <a:spLocks noChangeAspect="1"/>
+          </p:cNvSpPr>
+          <p:nvPr/>
+        </p:nvSpPr>
+        <p:spPr>
+          <a:xfrm>
+            <a:off x="8459163" y="3335194"/>
+            <a:ext cx="2368395" cy="2369248"/>
+          </a:xfrm>
+          <a:prstGeom prst="rect">
+            <a:avLst/>
+          </a:prstGeom>
+          <a:noFill/>
+          <a:ln w="76200">
+            <a:solidFill>
+              <a:srgbClr val="3EF850"/>
+            </a:solidFill>
+          </a:ln>
+        </p:spPr>
+        <p:style>
+          <a:lnRef idx="2">
+            <a:schemeClr val="accent1">
+              <a:shade val="50000"/>
+            </a:schemeClr>
+          </a:lnRef>
+          <a:fillRef idx="1">
+            <a:schemeClr val="accent1"/>
+          </a:fillRef>
+          <a:effectRef idx="0">
+            <a:schemeClr val="accent1"/>
+          </a:effectRef>
+          <a:fontRef idx="minor">
+            <a:schemeClr val="lt1"/>
+          </a:fontRef>
+        </p:style>
+        <p:txBody>
+          <a:bodyPr rtlCol="0" anchor="ctr"/>
+          <a:lstStyle/>
+          <a:p>
+            <a:pPr algn="ctr"/>
+            <a:endParaRPr lang="en-US"/>
+          </a:p>
+        </p:txBody>
+      </p:sp>
+      <p:sp>
+        <p:nvSpPr>
+          <p:cNvPr id="134" name="Rectangle 133">
+            <a:extLst>
+              <a:ext uri="{FF2B5EF4-FFF2-40B4-BE49-F238E27FC236}">
+                <a16:creationId xmlns:a16="http://schemas.microsoft.com/office/drawing/2014/main" id="{3E29B12E-F952-45BA-9374-078087534770}"/>
+              </a:ext>
+            </a:extLst>
+          </p:cNvPr>
+          <p:cNvSpPr>
+            <a:spLocks noChangeAspect="1"/>
+          </p:cNvSpPr>
+          <p:nvPr/>
+        </p:nvSpPr>
+        <p:spPr>
+          <a:xfrm>
+            <a:off x="8748765" y="3590540"/>
+            <a:ext cx="1781175" cy="1781817"/>
+          </a:xfrm>
+          <a:prstGeom prst="rect">
+            <a:avLst/>
+          </a:prstGeom>
+          <a:noFill/>
+          <a:ln w="76200">
+            <a:solidFill>
+              <a:srgbClr val="3EF850">
+                <a:alpha val="20000"/>
+              </a:srgbClr>
+            </a:solidFill>
+          </a:ln>
+        </p:spPr>
+        <p:style>
+          <a:lnRef idx="2">
+            <a:schemeClr val="accent1">
+              <a:shade val="50000"/>
+            </a:schemeClr>
+          </a:lnRef>
+          <a:fillRef idx="1">
+            <a:schemeClr val="accent1"/>
+          </a:fillRef>
+          <a:effectRef idx="0">
+            <a:schemeClr val="accent1"/>
+          </a:effectRef>
+          <a:fontRef idx="minor">
+            <a:schemeClr val="lt1"/>
+          </a:fontRef>
+        </p:style>
+        <p:txBody>
+          <a:bodyPr rtlCol="0" anchor="ctr"/>
+          <a:lstStyle/>
+          <a:p>
+            <a:pPr algn="ctr"/>
+            <a:endParaRPr lang="en-US"/>
+          </a:p>
+        </p:txBody>
+      </p:sp>
+      <p:cxnSp>
+        <p:nvCxnSpPr>
+          <p:cNvPr id="146" name="Straight Connector 145">
+            <a:extLst>
+              <a:ext uri="{FF2B5EF4-FFF2-40B4-BE49-F238E27FC236}">
+                <a16:creationId xmlns:a16="http://schemas.microsoft.com/office/drawing/2014/main" id="{657566F5-AB42-4FD0-9ED5-8A2FF7B14B09}"/>
+              </a:ext>
+            </a:extLst>
+          </p:cNvPr>
+          <p:cNvCxnSpPr>
+            <a:cxnSpLocks/>
+          </p:cNvCxnSpPr>
+          <p:nvPr/>
+        </p:nvCxnSpPr>
+        <p:spPr>
+          <a:xfrm flipH="1" flipV="1">
+            <a:off x="9694258" y="1242518"/>
+            <a:ext cx="429585" cy="1257"/>
+          </a:xfrm>
+          <a:prstGeom prst="line">
+            <a:avLst/>
+          </a:prstGeom>
+          <a:ln w="57150">
             <a:solidFill>
               <a:srgbClr val="3EF850"/>
             </a:solidFill>

</xml_diff>